<commit_message>
final changed to ppt
</commit_message>
<xml_diff>
--- a/Algorithmic Trading.pptx
+++ b/Algorithmic Trading.pptx
@@ -161,13 +161,14 @@
   <p1510:revLst>
     <p1510:client id="{0198047A-A04D-41E3-201B-2A3C6CEE2F64}" v="163" dt="2023-04-08T18:43:59.204"/>
     <p1510:client id="{09F323DF-6E61-8531-61CA-730030CE7BE2}" v="20" dt="2023-04-08T19:12:45.296"/>
-    <p1510:client id="{1B4B6A53-AB3D-7B40-9060-7AE9648CD734}" v="1881" dt="2023-04-08T19:19:53.409"/>
+    <p1510:client id="{17767978-0728-B7CF-70D3-8595B0E6396B}" v="59" dt="2023-04-08T19:41:42.421"/>
+    <p1510:client id="{1B4B6A53-AB3D-7B40-9060-7AE9648CD734}" v="1972" dt="2023-04-08T19:39:58.217"/>
     <p1510:client id="{26091702-FAA8-48F2-97C0-FC9752F311DE}" v="660" dt="2023-04-08T19:18:48.220"/>
     <p1510:client id="{3397811F-CECC-2B36-92EC-11FBC7ED526E}" v="795" dt="2023-04-08T16:07:50.635"/>
     <p1510:client id="{62153E75-630C-4C44-8267-20DB60D00A32}" v="820" dt="2023-04-08T16:52:07.230"/>
     <p1510:client id="{75F94A55-E60A-5A43-79BE-28DF0348FC3C}" v="23" dt="2023-04-08T18:34:54.085"/>
     <p1510:client id="{9990AAA8-B462-2583-1A8B-FC90C7E47C10}" v="963" vWet="964" dt="2023-04-08T18:11:25.319"/>
-    <p1510:client id="{A72A0F98-838C-F868-FC4C-898B394371FE}" v="210" dt="2023-04-08T19:16:02.454"/>
+    <p1510:client id="{A72A0F98-838C-F868-FC4C-898B394371FE}" v="584" dt="2023-04-08T19:34:50.041"/>
     <p1510:client id="{C9271BC2-A63A-CCC0-A7AB-70E06F7A8641}" v="61" dt="2023-04-08T16:15:30.836"/>
     <p1510:client id="{DD3A6744-E699-42FE-BCEA-EF76C859D3C2}" v="3" dt="2023-04-08T18:31:33.942"/>
   </p1510:revLst>
@@ -3316,7 +3317,7 @@
                 </a:spcBef>
               </a:pPr>
               <a:r>
-                <a:rPr lang="en-US" sz="2600" dirty="0">
+                <a:rPr lang="en-US" sz="2600">
                   <a:solidFill>
                     <a:srgbClr val="FFFFFF"/>
                   </a:solidFill>
@@ -3947,7 +3948,7 @@
               </a:lnSpc>
             </a:pPr>
             <a:r>
-              <a:rPr lang="en-US" sz="2400" dirty="0">
+              <a:rPr lang="en-US" sz="2400">
                 <a:solidFill>
                   <a:srgbClr val="271A62"/>
                 </a:solidFill>
@@ -3955,7 +3956,7 @@
               </a:rPr>
               <a:t>Lakshmi Mutyala </a:t>
             </a:r>
-            <a:endParaRPr lang="en-US" dirty="0"/>
+            <a:endParaRPr lang="en-US"/>
           </a:p>
           <a:p>
             <a:pPr algn="ctr">
@@ -3964,7 +3965,7 @@
               </a:lnSpc>
             </a:pPr>
             <a:r>
-              <a:rPr lang="en-US" sz="2400" dirty="0">
+              <a:rPr lang="en-US" sz="2400">
                 <a:solidFill>
                   <a:srgbClr val="271A62"/>
                 </a:solidFill>
@@ -4369,7 +4370,7 @@
                 </a:solidFill>
                 <a:latin typeface="Garet 1 Bold"/>
               </a:rPr>
-              <a:t>Agenda</a:t>
+              <a:t>Index</a:t>
             </a:r>
           </a:p>
         </p:txBody>
@@ -4383,7 +4384,7 @@
           <p:nvPr>
             <p:extLst>
               <p:ext uri="{D42A27DB-BD31-4B8C-83A1-F6EECF244321}">
-                <p14:modId xmlns:p14="http://schemas.microsoft.com/office/powerpoint/2010/main" val="3015629457"/>
+                <p14:modId xmlns:p14="http://schemas.microsoft.com/office/powerpoint/2010/main" val="415512482"/>
               </p:ext>
             </p:extLst>
           </p:nvPr>
@@ -4829,7 +4830,7 @@
                           </a:solidFill>
                           <a:latin typeface="Open Sauce"/>
                         </a:rPr>
-                        <a:t>Code</a:t>
+                        <a:t>Thought Process Behind the Code</a:t>
                       </a:r>
                     </a:p>
                   </a:txBody>
@@ -5223,7 +5224,6 @@
                         <a:lnSpc>
                           <a:spcPts val="3791"/>
                         </a:lnSpc>
-                        <a:defRPr/>
                       </a:pPr>
                       <a:r>
                         <a:rPr lang="en-US" sz="2400" u="sng" spc="23">
@@ -5232,13 +5232,8 @@
                           </a:solidFill>
                           <a:latin typeface="Open Sauce"/>
                         </a:rPr>
-                        <a:t>Team</a:t>
+                        <a:t>Next Phase of our Project</a:t>
                       </a:r>
-                      <a:endParaRPr lang="en-US" sz="2400" u="sng">
-                        <a:solidFill>
-                          <a:srgbClr val="1119F5"/>
-                        </a:solidFill>
-                      </a:endParaRPr>
                     </a:p>
                   </a:txBody>
                   <a:tcPr marL="114300" marR="114300" marT="114300" marB="114300" anchor="ctr">
@@ -5298,9 +5293,8 @@
                           </a:solidFill>
                           <a:latin typeface="Garet 1 Bold"/>
                         </a:rPr>
-                        <a:t>10</a:t>
+                        <a:t>09</a:t>
                       </a:r>
-                      <a:endParaRPr lang="en-US" sz="2950"/>
                     </a:p>
                   </a:txBody>
                   <a:tcPr marL="114300" marR="114300" marT="114300" marB="114300" anchor="ctr">
@@ -9104,7 +9098,7 @@
         </p:nvSpPr>
         <p:spPr>
           <a:xfrm>
-            <a:off x="1028700" y="1028700"/>
+            <a:off x="647700" y="1028700"/>
             <a:ext cx="7462235" cy="2154436"/>
           </a:xfrm>
           <a:prstGeom prst="rect">
@@ -9123,13 +9117,13 @@
               </a:lnSpc>
             </a:pPr>
             <a:r>
-              <a:rPr lang="en-US" sz="6950" spc="-139" dirty="0">
+              <a:rPr lang="en-US" sz="6950" spc="-139">
                 <a:solidFill>
                   <a:srgbClr val="271A62"/>
                 </a:solidFill>
                 <a:latin typeface="Garet 1 Bold"/>
               </a:rPr>
-              <a:t>Further Improvements</a:t>
+              <a:t>Next Phase of our Project</a:t>
             </a:r>
           </a:p>
         </p:txBody>
@@ -9223,21 +9217,21 @@
           <p:nvPr>
             <p:extLst>
               <p:ext uri="{D42A27DB-BD31-4B8C-83A1-F6EECF244321}">
-                <p14:modId xmlns:p14="http://schemas.microsoft.com/office/powerpoint/2010/main" val="2209215602"/>
+                <p14:modId xmlns:p14="http://schemas.microsoft.com/office/powerpoint/2010/main" val="232766411"/>
               </p:ext>
             </p:extLst>
           </p:nvPr>
         </p:nvGraphicFramePr>
         <p:xfrm>
-          <a:off x="8616338" y="1028700"/>
-          <a:ext cx="9282121" cy="5978093"/>
+          <a:off x="7151797" y="1899071"/>
+          <a:ext cx="10402261" cy="6640725"/>
         </p:xfrm>
         <a:graphic>
           <a:graphicData uri="http://schemas.openxmlformats.org/drawingml/2006/table">
             <a:tbl>
               <a:tblPr/>
               <a:tblGrid>
-                <a:gridCol w="9282121">
+                <a:gridCol w="10402261">
                   <a:extLst>
                     <a:ext uri="{9D8B030D-6E8A-4147-A177-3AD203B41FA5}">
                       <a16:colId xmlns:a16="http://schemas.microsoft.com/office/drawing/2014/main" val="20000"/>
@@ -9245,78 +9239,7 @@
                   </a:extLst>
                 </a:gridCol>
               </a:tblGrid>
-              <a:tr h="1012890">
-                <a:tc>
-                  <a:txBody>
-                    <a:bodyPr/>
-                    <a:lstStyle/>
-                    <a:p>
-                      <a:pPr marL="0" lvl="0" indent="0" algn="ctr">
-                        <a:lnSpc>
-                          <a:spcPts val="2520"/>
-                        </a:lnSpc>
-                        <a:spcBef>
-                          <a:spcPct val="0"/>
-                        </a:spcBef>
-                        <a:defRPr/>
-                      </a:pPr>
-                      <a:endParaRPr lang="en-US" sz="1800">
-                        <a:solidFill>
-                          <a:srgbClr val="FFFFFF"/>
-                        </a:solidFill>
-                        <a:latin typeface="Garet 1 Bold"/>
-                      </a:endParaRPr>
-                    </a:p>
-                  </a:txBody>
-                  <a:tcPr marL="190500" marR="190500" marT="190500" marB="190500" anchor="ctr">
-                    <a:lnL w="0" cap="flat" cmpd="sng" algn="ctr">
-                      <a:solidFill>
-                        <a:srgbClr val="CCCCCC"/>
-                      </a:solidFill>
-                      <a:prstDash val="solid"/>
-                      <a:round/>
-                      <a:headEnd type="none" w="med" len="med"/>
-                      <a:tailEnd type="none" w="med" len="med"/>
-                    </a:lnL>
-                    <a:lnR w="0" cap="flat" cmpd="sng" algn="ctr">
-                      <a:solidFill>
-                        <a:srgbClr val="CCCCCC"/>
-                      </a:solidFill>
-                      <a:prstDash val="solid"/>
-                      <a:round/>
-                      <a:headEnd type="none" w="med" len="med"/>
-                      <a:tailEnd type="none" w="med" len="med"/>
-                    </a:lnR>
-                    <a:lnT w="0" cap="flat" cmpd="sng" algn="ctr">
-                      <a:solidFill>
-                        <a:srgbClr val="CCCCCC"/>
-                      </a:solidFill>
-                      <a:prstDash val="solid"/>
-                      <a:round/>
-                      <a:headEnd type="none" w="med" len="med"/>
-                      <a:tailEnd type="none" w="med" len="med"/>
-                    </a:lnT>
-                    <a:lnB w="0" cap="flat" cmpd="sng" algn="ctr">
-                      <a:solidFill>
-                        <a:srgbClr val="CCCCCC"/>
-                      </a:solidFill>
-                      <a:prstDash val="solid"/>
-                      <a:round/>
-                      <a:headEnd type="none" w="med" len="med"/>
-                      <a:tailEnd type="none" w="med" len="med"/>
-                    </a:lnB>
-                    <a:solidFill>
-                      <a:srgbClr val="8167FF"/>
-                    </a:solidFill>
-                  </a:tcPr>
-                </a:tc>
-                <a:extLst>
-                  <a:ext uri="{0D108BD9-81ED-4DB2-BD59-A6C34878D82A}">
-                    <a16:rowId xmlns:a16="http://schemas.microsoft.com/office/drawing/2014/main" val="10000"/>
-                  </a:ext>
-                </a:extLst>
-              </a:tr>
-              <a:tr h="1265018">
+              <a:tr h="1613707">
                 <a:tc>
                   <a:txBody>
                     <a:bodyPr/>
@@ -9324,12 +9247,12 @@
                     <a:p>
                       <a:pPr algn="l">
                         <a:lnSpc>
-                          <a:spcPts val="2239"/>
+                          <a:spcPct val="100000"/>
                         </a:lnSpc>
                       </a:pPr>
                       <a:r>
-                        <a:rPr lang="en-US" sz="2400" dirty="0"/>
-                        <a:t>Trailing stop loss should be adapted to any trade to further improve profits.</a:t>
+                        <a:rPr lang="en-US" sz="3200"/>
+                        <a:t>Adapting trailing stop loss to every trade to improve profits.</a:t>
                       </a:r>
                     </a:p>
                   </a:txBody>
@@ -9381,21 +9304,25 @@
                   </a:ext>
                 </a:extLst>
               </a:tr>
-              <a:tr h="1233395">
+              <a:tr h="1851660">
                 <a:tc>
                   <a:txBody>
                     <a:bodyPr/>
                     <a:lstStyle/>
                     <a:p>
-                      <a:pPr algn="l">
+                      <a:pPr lvl="0" algn="l">
                         <a:lnSpc>
-                          <a:spcPts val="2239"/>
+                          <a:spcPct val="100000"/>
                         </a:lnSpc>
+                        <a:buNone/>
                       </a:pPr>
                       <a:r>
-                        <a:rPr lang="en-US" sz="2400" dirty="0"/>
-                        <a:t>We intend to incorporate overall market trend , Global cues and other indicators </a:t>
+                        <a:rPr lang="en-US" sz="3200" b="0" i="0" u="none" strike="noStrike" noProof="0">
+                          <a:latin typeface="Calibri"/>
+                        </a:rPr>
+                        <a:t>We plan to integrate various factors such as market trend, global market conditions, and other relevant indicators into our trading algorithm to enhance its effectiveness.</a:t>
                       </a:r>
+                      <a:endParaRPr lang="en-US" sz="3200"/>
                     </a:p>
                   </a:txBody>
                   <a:tcPr marL="190500" marR="190500" marT="190500" marB="190500" anchor="ctr">
@@ -9446,7 +9373,7 @@
                   </a:ext>
                 </a:extLst>
               </a:tr>
-              <a:tr h="1233395">
+              <a:tr h="1587679">
                 <a:tc>
                   <a:txBody>
                     <a:bodyPr/>
@@ -9454,12 +9381,12 @@
                     <a:p>
                       <a:pPr algn="l">
                         <a:lnSpc>
-                          <a:spcPts val="2239"/>
+                          <a:spcPct val="100000"/>
                         </a:lnSpc>
                       </a:pPr>
                       <a:r>
-                        <a:rPr lang="en-US" sz="2400" dirty="0"/>
-                        <a:t>Analysis should be on multiple timeframes</a:t>
+                        <a:rPr lang="en-US" sz="3200"/>
+                        <a:t>To improve our accuracy, we intend to analyze the data over multiple timeframes</a:t>
                       </a:r>
                     </a:p>
                   </a:txBody>
@@ -9511,7 +9438,7 @@
                   </a:ext>
                 </a:extLst>
               </a:tr>
-              <a:tr h="1233395">
+              <a:tr h="1587679">
                 <a:tc>
                   <a:txBody>
                     <a:bodyPr/>
@@ -9519,12 +9446,12 @@
                     <a:p>
                       <a:pPr algn="l">
                         <a:lnSpc>
-                          <a:spcPts val="2239"/>
+                          <a:spcPct val="100000"/>
                         </a:lnSpc>
                       </a:pPr>
                       <a:r>
-                        <a:rPr lang="en-US" sz="2400" dirty="0"/>
-                        <a:t>Integrate with live data to get buy signals in real time.</a:t>
+                        <a:rPr lang="en-US" sz="3200"/>
+                        <a:t>Try to generate real-time signals by integrating the algorithm with real time data. </a:t>
                       </a:r>
                     </a:p>
                   </a:txBody>

</xml_diff>